<commit_message>
@Repository - Optional<> findBy
</commit_message>
<xml_diff>
--- a/other/專題.pptx
+++ b/other/專題.pptx
@@ -11,9 +11,9 @@
     <p:sldId id="256" r:id="rId2"/>
     <p:sldId id="259" r:id="rId3"/>
     <p:sldId id="261" r:id="rId4"/>
-    <p:sldId id="262" r:id="rId5"/>
-    <p:sldId id="268" r:id="rId6"/>
-    <p:sldId id="269" r:id="rId7"/>
+    <p:sldId id="271" r:id="rId5"/>
+    <p:sldId id="262" r:id="rId6"/>
+    <p:sldId id="268" r:id="rId7"/>
     <p:sldId id="270" r:id="rId8"/>
     <p:sldId id="263" r:id="rId9"/>
     <p:sldId id="264" r:id="rId10"/>
@@ -126,9 +126,9 @@
             <p14:sldId id="256"/>
             <p14:sldId id="259"/>
             <p14:sldId id="261"/>
+            <p14:sldId id="271"/>
             <p14:sldId id="262"/>
             <p14:sldId id="268"/>
-            <p14:sldId id="269"/>
             <p14:sldId id="270"/>
           </p14:sldIdLst>
         </p14:section>
@@ -236,7 +236,7 @@
           <a:p>
             <a:fld id="{4F1AED75-714C-4D3D-BEC4-DC526DFB0DBA}" type="datetimeFigureOut">
               <a:rPr lang="zh-TW" altLang="en-US" smtClean="0"/>
-              <a:t>2024/11/12</a:t>
+              <a:t>2024/11/29</a:t>
             </a:fld>
             <a:endParaRPr lang="zh-TW" altLang="en-US"/>
           </a:p>
@@ -870,7 +870,7 @@
           <a:p>
             <a:fld id="{F44A2D49-3011-4869-9FF8-DF32A7D4878A}" type="datetimeFigureOut">
               <a:rPr lang="zh-TW" altLang="en-US" smtClean="0"/>
-              <a:t>2024/11/12</a:t>
+              <a:t>2024/11/29</a:t>
             </a:fld>
             <a:endParaRPr lang="zh-TW" altLang="en-US"/>
           </a:p>
@@ -1068,7 +1068,7 @@
           <a:p>
             <a:fld id="{F44A2D49-3011-4869-9FF8-DF32A7D4878A}" type="datetimeFigureOut">
               <a:rPr lang="zh-TW" altLang="en-US" smtClean="0"/>
-              <a:t>2024/11/12</a:t>
+              <a:t>2024/11/29</a:t>
             </a:fld>
             <a:endParaRPr lang="zh-TW" altLang="en-US"/>
           </a:p>
@@ -1276,7 +1276,7 @@
           <a:p>
             <a:fld id="{F44A2D49-3011-4869-9FF8-DF32A7D4878A}" type="datetimeFigureOut">
               <a:rPr lang="zh-TW" altLang="en-US" smtClean="0"/>
-              <a:t>2024/11/12</a:t>
+              <a:t>2024/11/29</a:t>
             </a:fld>
             <a:endParaRPr lang="zh-TW" altLang="en-US"/>
           </a:p>
@@ -1474,7 +1474,7 @@
           <a:p>
             <a:fld id="{F44A2D49-3011-4869-9FF8-DF32A7D4878A}" type="datetimeFigureOut">
               <a:rPr lang="zh-TW" altLang="en-US" smtClean="0"/>
-              <a:t>2024/11/12</a:t>
+              <a:t>2024/11/29</a:t>
             </a:fld>
             <a:endParaRPr lang="zh-TW" altLang="en-US"/>
           </a:p>
@@ -1749,7 +1749,7 @@
           <a:p>
             <a:fld id="{F44A2D49-3011-4869-9FF8-DF32A7D4878A}" type="datetimeFigureOut">
               <a:rPr lang="zh-TW" altLang="en-US" smtClean="0"/>
-              <a:t>2024/11/12</a:t>
+              <a:t>2024/11/29</a:t>
             </a:fld>
             <a:endParaRPr lang="zh-TW" altLang="en-US"/>
           </a:p>
@@ -2014,7 +2014,7 @@
           <a:p>
             <a:fld id="{F44A2D49-3011-4869-9FF8-DF32A7D4878A}" type="datetimeFigureOut">
               <a:rPr lang="zh-TW" altLang="en-US" smtClean="0"/>
-              <a:t>2024/11/12</a:t>
+              <a:t>2024/11/29</a:t>
             </a:fld>
             <a:endParaRPr lang="zh-TW" altLang="en-US"/>
           </a:p>
@@ -2426,7 +2426,7 @@
           <a:p>
             <a:fld id="{F44A2D49-3011-4869-9FF8-DF32A7D4878A}" type="datetimeFigureOut">
               <a:rPr lang="zh-TW" altLang="en-US" smtClean="0"/>
-              <a:t>2024/11/12</a:t>
+              <a:t>2024/11/29</a:t>
             </a:fld>
             <a:endParaRPr lang="zh-TW" altLang="en-US"/>
           </a:p>
@@ -2567,7 +2567,7 @@
           <a:p>
             <a:fld id="{F44A2D49-3011-4869-9FF8-DF32A7D4878A}" type="datetimeFigureOut">
               <a:rPr lang="zh-TW" altLang="en-US" smtClean="0"/>
-              <a:t>2024/11/12</a:t>
+              <a:t>2024/11/29</a:t>
             </a:fld>
             <a:endParaRPr lang="zh-TW" altLang="en-US"/>
           </a:p>
@@ -2680,7 +2680,7 @@
           <a:p>
             <a:fld id="{F44A2D49-3011-4869-9FF8-DF32A7D4878A}" type="datetimeFigureOut">
               <a:rPr lang="zh-TW" altLang="en-US" smtClean="0"/>
-              <a:t>2024/11/12</a:t>
+              <a:t>2024/11/29</a:t>
             </a:fld>
             <a:endParaRPr lang="zh-TW" altLang="en-US"/>
           </a:p>
@@ -2991,7 +2991,7 @@
           <a:p>
             <a:fld id="{F44A2D49-3011-4869-9FF8-DF32A7D4878A}" type="datetimeFigureOut">
               <a:rPr lang="zh-TW" altLang="en-US" smtClean="0"/>
-              <a:t>2024/11/12</a:t>
+              <a:t>2024/11/29</a:t>
             </a:fld>
             <a:endParaRPr lang="zh-TW" altLang="en-US"/>
           </a:p>
@@ -3279,7 +3279,7 @@
           <a:p>
             <a:fld id="{F44A2D49-3011-4869-9FF8-DF32A7D4878A}" type="datetimeFigureOut">
               <a:rPr lang="zh-TW" altLang="en-US" smtClean="0"/>
-              <a:t>2024/11/12</a:t>
+              <a:t>2024/11/29</a:t>
             </a:fld>
             <a:endParaRPr lang="zh-TW" altLang="en-US"/>
           </a:p>
@@ -3520,7 +3520,7 @@
           <a:p>
             <a:fld id="{F44A2D49-3011-4869-9FF8-DF32A7D4878A}" type="datetimeFigureOut">
               <a:rPr lang="zh-TW" altLang="en-US" smtClean="0"/>
-              <a:t>2024/11/12</a:t>
+              <a:t>2024/11/29</a:t>
             </a:fld>
             <a:endParaRPr lang="zh-TW" altLang="en-US"/>
           </a:p>
@@ -11256,7 +11256,7 @@
           <p:cNvPr id="2" name="標題 1">
             <a:extLst>
               <a:ext uri="{FF2B5EF4-FFF2-40B4-BE49-F238E27FC236}">
-                <a16:creationId xmlns:a16="http://schemas.microsoft.com/office/drawing/2014/main" id="{3930E9D2-DB71-447B-948B-5D88F00DACA3}"/>
+                <a16:creationId xmlns:a16="http://schemas.microsoft.com/office/drawing/2014/main" id="{DE943992-5814-4B8A-B308-6371E6DAEFBC}"/>
               </a:ext>
             </a:extLst>
           </p:cNvPr>
@@ -11267,12 +11267,20 @@
             <p:ph type="title"/>
           </p:nvPr>
         </p:nvSpPr>
-        <p:spPr/>
+        <p:spPr>
+          <a:xfrm>
+            <a:off x="0" y="0"/>
+            <a:ext cx="10515600" cy="1325563"/>
+          </a:xfrm>
+        </p:spPr>
         <p:txBody>
           <a:bodyPr/>
           <a:lstStyle/>
           <a:p>
-            <a:endParaRPr lang="zh-TW" altLang="en-US"/>
+            <a:r>
+              <a:rPr lang="zh-TW" altLang="en-US" dirty="0"/>
+              <a:t>功能</a:t>
+            </a:r>
           </a:p>
         </p:txBody>
       </p:sp>
@@ -11281,7 +11289,7 @@
           <p:cNvPr id="3" name="內容版面配置區 2">
             <a:extLst>
               <a:ext uri="{FF2B5EF4-FFF2-40B4-BE49-F238E27FC236}">
-                <a16:creationId xmlns:a16="http://schemas.microsoft.com/office/drawing/2014/main" id="{59CD18E6-BB6B-4CC9-875E-6160ED8F5021}"/>
+                <a16:creationId xmlns:a16="http://schemas.microsoft.com/office/drawing/2014/main" id="{8A08B255-A2FF-4BAF-95A2-0FCBFFE322BE}"/>
               </a:ext>
             </a:extLst>
           </p:cNvPr>
@@ -11292,98 +11300,125 @@
             <p:ph idx="1"/>
           </p:nvPr>
         </p:nvSpPr>
-        <p:spPr/>
+        <p:spPr>
+          <a:xfrm>
+            <a:off x="0" y="1325563"/>
+            <a:ext cx="10515600" cy="4351338"/>
+          </a:xfrm>
+        </p:spPr>
         <p:txBody>
           <a:bodyPr/>
           <a:lstStyle/>
           <a:p>
             <a:r>
               <a:rPr lang="zh-TW" altLang="en-US" dirty="0"/>
-              <a:t>教練</a:t>
+              <a:t>活動管理員 </a:t>
             </a:r>
             <a:r>
               <a:rPr lang="en-US" altLang="zh-TW" dirty="0"/>
-              <a:t>: </a:t>
+              <a:t>– </a:t>
             </a:r>
             <a:r>
               <a:rPr lang="zh-TW" altLang="en-US" dirty="0"/>
-              <a:t>可以看到人員名單、電話</a:t>
+              <a:t>新增按鈕</a:t>
             </a:r>
             <a:endParaRPr lang="en-US" altLang="zh-TW" dirty="0"/>
           </a:p>
           <a:p>
+            <a:endParaRPr lang="en-US" altLang="zh-TW" dirty="0"/>
+          </a:p>
+          <a:p>
+            <a:r>
+              <a:rPr lang="en-US" altLang="zh-TW" dirty="0"/>
+              <a:t>AS</a:t>
+            </a:r>
             <a:r>
               <a:rPr lang="zh-TW" altLang="en-US" dirty="0"/>
-              <a:t>會員</a:t>
+              <a:t> </a:t>
             </a:r>
             <a:r>
               <a:rPr lang="en-US" altLang="zh-TW" dirty="0"/>
-              <a:t>:</a:t>
+              <a:t>–</a:t>
             </a:r>
             <a:r>
               <a:rPr lang="zh-TW" altLang="en-US" dirty="0"/>
-              <a:t> 要打勾</a:t>
+              <a:t> </a:t>
+            </a:r>
+            <a:r>
+              <a:rPr lang="en-US" altLang="zh-TW" dirty="0" err="1"/>
+              <a:t>findBy</a:t>
             </a:r>
             <a:r>
               <a:rPr lang="en-US" altLang="zh-TW" dirty="0"/>
-              <a:t>(</a:t>
+              <a:t> </a:t>
             </a:r>
             <a:r>
               <a:rPr lang="zh-TW" altLang="en-US" dirty="0"/>
-              <a:t>時間、地點、注意事項</a:t>
+              <a:t>教室、教練、課程類型</a:t>
+            </a:r>
+            <a:endParaRPr lang="en-US" altLang="zh-TW" dirty="0"/>
+          </a:p>
+          <a:p>
+            <a:endParaRPr lang="en-US" altLang="zh-TW" dirty="0"/>
+          </a:p>
+          <a:p>
+            <a:r>
+              <a:rPr lang="zh-TW" altLang="en-US" dirty="0"/>
+              <a:t>教練 </a:t>
             </a:r>
             <a:r>
               <a:rPr lang="en-US" altLang="zh-TW" dirty="0"/>
-              <a:t>—</a:t>
+              <a:t>– </a:t>
+            </a:r>
+            <a:r>
+              <a:rPr lang="en-US" altLang="zh-TW" dirty="0" err="1"/>
+              <a:t>findBy</a:t>
+            </a:r>
+            <a:r>
+              <a:rPr lang="en-US" altLang="zh-TW" dirty="0"/>
+              <a:t> </a:t>
             </a:r>
             <a:r>
               <a:rPr lang="zh-TW" altLang="en-US" dirty="0"/>
-              <a:t>教練填寫</a:t>
+              <a:t>課程類型</a:t>
+            </a:r>
+            <a:endParaRPr lang="en-US" altLang="zh-TW" dirty="0"/>
+          </a:p>
+          <a:p>
+            <a:endParaRPr lang="en-US" altLang="zh-TW" dirty="0"/>
+          </a:p>
+          <a:p>
+            <a:r>
+              <a:rPr lang="zh-TW" altLang="en-US" dirty="0"/>
+              <a:t>會員 </a:t>
             </a:r>
             <a:r>
               <a:rPr lang="en-US" altLang="zh-TW" dirty="0"/>
-              <a:t>)—</a:t>
+              <a:t>–</a:t>
             </a:r>
             <a:r>
               <a:rPr lang="zh-TW" altLang="en-US" dirty="0"/>
-              <a:t>我已了解</a:t>
+              <a:t> </a:t>
+            </a:r>
+            <a:r>
+              <a:rPr lang="en-US" altLang="zh-TW" dirty="0" err="1"/>
+              <a:t>findBy</a:t>
             </a:r>
             <a:r>
               <a:rPr lang="en-US" altLang="zh-TW" dirty="0"/>
-              <a:t>…</a:t>
-            </a:r>
-            <a:br>
-              <a:rPr lang="en-US" altLang="zh-TW" dirty="0"/>
-            </a:br>
+              <a:t> </a:t>
+            </a:r>
             <a:r>
               <a:rPr lang="zh-TW" altLang="en-US" dirty="0"/>
-              <a:t>、報名數量上限、未到停權</a:t>
-            </a:r>
-            <a:r>
-              <a:rPr lang="en-US" altLang="zh-TW" dirty="0"/>
-              <a:t>(</a:t>
-            </a:r>
-            <a:r>
-              <a:rPr lang="zh-TW" altLang="en-US" dirty="0"/>
-              <a:t>報名權</a:t>
-            </a:r>
-            <a:r>
-              <a:rPr lang="en-US" altLang="zh-TW" dirty="0"/>
-              <a:t>)</a:t>
-            </a:r>
-          </a:p>
-          <a:p>
-            <a:endParaRPr lang="en-US" altLang="zh-TW" dirty="0"/>
-          </a:p>
-          <a:p>
-            <a:endParaRPr lang="en-US" altLang="zh-TW" dirty="0"/>
+              <a:t>活動</a:t>
+            </a:r>
           </a:p>
         </p:txBody>
       </p:sp>
     </p:spTree>
     <p:extLst>
       <p:ext uri="{BB962C8B-B14F-4D97-AF65-F5344CB8AC3E}">
-        <p14:creationId xmlns:p14="http://schemas.microsoft.com/office/powerpoint/2010/main" val="385906202"/>
+        <p14:creationId xmlns:p14="http://schemas.microsoft.com/office/powerpoint/2010/main" val="3506831357"/>
       </p:ext>
     </p:extLst>
   </p:cSld>
@@ -11415,7 +11450,7 @@
           <p:cNvPr id="2" name="標題 1">
             <a:extLst>
               <a:ext uri="{FF2B5EF4-FFF2-40B4-BE49-F238E27FC236}">
-                <a16:creationId xmlns:a16="http://schemas.microsoft.com/office/drawing/2014/main" id="{4DE388DB-4537-4A27-9642-7150C811EAC3}"/>
+                <a16:creationId xmlns:a16="http://schemas.microsoft.com/office/drawing/2014/main" id="{3930E9D2-DB71-447B-948B-5D88F00DACA3}"/>
               </a:ext>
             </a:extLst>
           </p:cNvPr>
@@ -11431,31 +11466,7 @@
           <a:bodyPr/>
           <a:lstStyle/>
           <a:p>
-            <a:r>
-              <a:rPr lang="zh-TW" altLang="en-US" dirty="0"/>
-              <a:t>如何搜尋 </a:t>
-            </a:r>
-            <a:r>
-              <a:rPr lang="en-US" altLang="zh-TW" dirty="0"/>
-              <a:t>–</a:t>
-            </a:r>
-            <a:r>
-              <a:rPr lang="zh-TW" altLang="en-US" dirty="0"/>
-              <a:t> 根據</a:t>
-            </a:r>
-            <a:r>
-              <a:rPr lang="en-US" altLang="zh-TW" dirty="0"/>
-              <a:t>(</a:t>
-            </a:r>
-            <a:r>
-              <a:rPr lang="zh-TW" altLang="en-US" dirty="0"/>
-              <a:t>按鈕</a:t>
-            </a:r>
-            <a:r>
-              <a:rPr lang="en-US" altLang="zh-TW" dirty="0"/>
-              <a:t>)</a:t>
-            </a:r>
-            <a:endParaRPr lang="zh-TW" altLang="en-US" dirty="0"/>
+            <a:endParaRPr lang="zh-TW" altLang="en-US"/>
           </a:p>
         </p:txBody>
       </p:sp>
@@ -11464,7 +11475,7 @@
           <p:cNvPr id="3" name="內容版面配置區 2">
             <a:extLst>
               <a:ext uri="{FF2B5EF4-FFF2-40B4-BE49-F238E27FC236}">
-                <a16:creationId xmlns:a16="http://schemas.microsoft.com/office/drawing/2014/main" id="{E7912B7A-C656-453C-A048-69FC100D70D9}"/>
+                <a16:creationId xmlns:a16="http://schemas.microsoft.com/office/drawing/2014/main" id="{59CD18E6-BB6B-4CC9-875E-6160ED8F5021}"/>
               </a:ext>
             </a:extLst>
           </p:cNvPr>
@@ -11482,29 +11493,91 @@
           <a:p>
             <a:r>
               <a:rPr lang="zh-TW" altLang="en-US" dirty="0"/>
-              <a:t>地區</a:t>
+              <a:t>教練</a:t>
+            </a:r>
+            <a:r>
+              <a:rPr lang="en-US" altLang="zh-TW" dirty="0"/>
+              <a:t>: </a:t>
+            </a:r>
+            <a:r>
+              <a:rPr lang="zh-TW" altLang="en-US" dirty="0"/>
+              <a:t>可以看到人員名單、電話</a:t>
             </a:r>
             <a:endParaRPr lang="en-US" altLang="zh-TW" dirty="0"/>
           </a:p>
           <a:p>
             <a:r>
               <a:rPr lang="zh-TW" altLang="en-US" dirty="0"/>
-              <a:t>時間</a:t>
-            </a:r>
+              <a:t>會員</a:t>
+            </a:r>
+            <a:r>
+              <a:rPr lang="en-US" altLang="zh-TW" dirty="0"/>
+              <a:t>:</a:t>
+            </a:r>
+            <a:r>
+              <a:rPr lang="zh-TW" altLang="en-US" dirty="0"/>
+              <a:t> 要打勾</a:t>
+            </a:r>
+            <a:r>
+              <a:rPr lang="en-US" altLang="zh-TW" dirty="0"/>
+              <a:t>(</a:t>
+            </a:r>
+            <a:r>
+              <a:rPr lang="zh-TW" altLang="en-US" dirty="0"/>
+              <a:t>時間、地點、注意事項</a:t>
+            </a:r>
+            <a:r>
+              <a:rPr lang="en-US" altLang="zh-TW" dirty="0"/>
+              <a:t>—</a:t>
+            </a:r>
+            <a:r>
+              <a:rPr lang="zh-TW" altLang="en-US" dirty="0"/>
+              <a:t>教練填寫</a:t>
+            </a:r>
+            <a:r>
+              <a:rPr lang="en-US" altLang="zh-TW" dirty="0"/>
+              <a:t>)—</a:t>
+            </a:r>
+            <a:r>
+              <a:rPr lang="zh-TW" altLang="en-US" dirty="0"/>
+              <a:t>我已了解</a:t>
+            </a:r>
+            <a:r>
+              <a:rPr lang="en-US" altLang="zh-TW" dirty="0"/>
+              <a:t>…</a:t>
+            </a:r>
+            <a:br>
+              <a:rPr lang="en-US" altLang="zh-TW" dirty="0"/>
+            </a:br>
+            <a:r>
+              <a:rPr lang="zh-TW" altLang="en-US" dirty="0"/>
+              <a:t>、報名數量上限、未到停權</a:t>
+            </a:r>
+            <a:r>
+              <a:rPr lang="en-US" altLang="zh-TW" dirty="0"/>
+              <a:t>(</a:t>
+            </a:r>
+            <a:r>
+              <a:rPr lang="zh-TW" altLang="en-US" dirty="0"/>
+              <a:t>報名權</a:t>
+            </a:r>
+            <a:r>
+              <a:rPr lang="en-US" altLang="zh-TW" dirty="0"/>
+              <a:t>)</a:t>
+            </a:r>
+          </a:p>
+          <a:p>
             <a:endParaRPr lang="en-US" altLang="zh-TW" dirty="0"/>
           </a:p>
           <a:p>
-            <a:r>
-              <a:rPr lang="zh-TW" altLang="en-US" dirty="0"/>
-              <a:t>房間</a:t>
-            </a:r>
+            <a:endParaRPr lang="en-US" altLang="zh-TW" dirty="0"/>
           </a:p>
         </p:txBody>
       </p:sp>
     </p:spTree>
     <p:extLst>
       <p:ext uri="{BB962C8B-B14F-4D97-AF65-F5344CB8AC3E}">
-        <p14:creationId xmlns:p14="http://schemas.microsoft.com/office/powerpoint/2010/main" val="3471917794"/>
+        <p14:creationId xmlns:p14="http://schemas.microsoft.com/office/powerpoint/2010/main" val="385906202"/>
       </p:ext>
     </p:extLst>
   </p:cSld>
@@ -11536,7 +11609,7 @@
           <p:cNvPr id="2" name="標題 1">
             <a:extLst>
               <a:ext uri="{FF2B5EF4-FFF2-40B4-BE49-F238E27FC236}">
-                <a16:creationId xmlns:a16="http://schemas.microsoft.com/office/drawing/2014/main" id="{A0206905-F15F-4206-82A2-4D4C23A31A24}"/>
+                <a16:creationId xmlns:a16="http://schemas.microsoft.com/office/drawing/2014/main" id="{4DE388DB-4537-4A27-9642-7150C811EAC3}"/>
               </a:ext>
             </a:extLst>
           </p:cNvPr>
@@ -11554,47 +11627,78 @@
           <a:p>
             <a:r>
               <a:rPr lang="zh-TW" altLang="en-US" dirty="0"/>
-              <a:t>主要搜尋頁面資訊</a:t>
-            </a:r>
-          </a:p>
-        </p:txBody>
-      </p:sp>
-      <p:pic>
-        <p:nvPicPr>
-          <p:cNvPr id="4" name="內容版面配置區 3">
-            <a:extLst>
-              <a:ext uri="{FF2B5EF4-FFF2-40B4-BE49-F238E27FC236}">
-                <a16:creationId xmlns:a16="http://schemas.microsoft.com/office/drawing/2014/main" id="{30AE3310-D37B-4702-BAD1-FB10172C014C}"/>
-              </a:ext>
-            </a:extLst>
-          </p:cNvPr>
-          <p:cNvPicPr>
-            <a:picLocks noGrp="1" noChangeAspect="1"/>
-          </p:cNvPicPr>
+              <a:t>如何搜尋 </a:t>
+            </a:r>
+            <a:r>
+              <a:rPr lang="en-US" altLang="zh-TW" dirty="0"/>
+              <a:t>–</a:t>
+            </a:r>
+            <a:r>
+              <a:rPr lang="zh-TW" altLang="en-US" dirty="0"/>
+              <a:t> 根據</a:t>
+            </a:r>
+            <a:r>
+              <a:rPr lang="en-US" altLang="zh-TW" dirty="0"/>
+              <a:t>(</a:t>
+            </a:r>
+            <a:r>
+              <a:rPr lang="zh-TW" altLang="en-US" dirty="0"/>
+              <a:t>按鈕</a:t>
+            </a:r>
+            <a:r>
+              <a:rPr lang="en-US" altLang="zh-TW" dirty="0"/>
+              <a:t>)</a:t>
+            </a:r>
+            <a:endParaRPr lang="zh-TW" altLang="en-US" dirty="0"/>
+          </a:p>
+        </p:txBody>
+      </p:sp>
+      <p:sp>
+        <p:nvSpPr>
+          <p:cNvPr id="3" name="內容版面配置區 2">
+            <a:extLst>
+              <a:ext uri="{FF2B5EF4-FFF2-40B4-BE49-F238E27FC236}">
+                <a16:creationId xmlns:a16="http://schemas.microsoft.com/office/drawing/2014/main" id="{E7912B7A-C656-453C-A048-69FC100D70D9}"/>
+              </a:ext>
+            </a:extLst>
+          </p:cNvPr>
+          <p:cNvSpPr>
+            <a:spLocks noGrp="1"/>
+          </p:cNvSpPr>
           <p:nvPr>
             <p:ph idx="1"/>
           </p:nvPr>
-        </p:nvPicPr>
-        <p:blipFill>
-          <a:blip r:embed="rId2"/>
-          <a:stretch>
-            <a:fillRect/>
-          </a:stretch>
-        </p:blipFill>
-        <p:spPr>
-          <a:xfrm>
-            <a:off x="2409835" y="1825625"/>
-            <a:ext cx="7372330" cy="4351338"/>
-          </a:xfrm>
-          <a:prstGeom prst="rect">
-            <a:avLst/>
-          </a:prstGeom>
-        </p:spPr>
-      </p:pic>
+        </p:nvSpPr>
+        <p:spPr/>
+        <p:txBody>
+          <a:bodyPr/>
+          <a:lstStyle/>
+          <a:p>
+            <a:r>
+              <a:rPr lang="zh-TW" altLang="en-US" dirty="0"/>
+              <a:t>地區</a:t>
+            </a:r>
+            <a:endParaRPr lang="en-US" altLang="zh-TW" dirty="0"/>
+          </a:p>
+          <a:p>
+            <a:r>
+              <a:rPr lang="zh-TW" altLang="en-US" dirty="0"/>
+              <a:t>時間</a:t>
+            </a:r>
+            <a:endParaRPr lang="en-US" altLang="zh-TW" dirty="0"/>
+          </a:p>
+          <a:p>
+            <a:r>
+              <a:rPr lang="zh-TW" altLang="en-US" dirty="0"/>
+              <a:t>房間</a:t>
+            </a:r>
+          </a:p>
+        </p:txBody>
+      </p:sp>
     </p:spTree>
     <p:extLst>
       <p:ext uri="{BB962C8B-B14F-4D97-AF65-F5344CB8AC3E}">
-        <p14:creationId xmlns:p14="http://schemas.microsoft.com/office/powerpoint/2010/main" val="1203680226"/>
+        <p14:creationId xmlns:p14="http://schemas.microsoft.com/office/powerpoint/2010/main" val="3471917794"/>
       </p:ext>
     </p:extLst>
   </p:cSld>

</xml_diff>